<commit_message>
Add trialCount | Add conversion from mat to R | Fix bad_trial_i.any
</commit_message>
<xml_diff>
--- a/paper/design figure.pptx
+++ b/paper/design figure.pptx
@@ -269,7 +269,7 @@
           <a:p>
             <a:fld id="{A1208381-D324-4E16-878A-260944863543}" type="datetimeFigureOut">
               <a:rPr lang="he-IL" smtClean="0"/>
-              <a:t>ח'/אלול/תשפ"א</a:t>
+              <a:t>ל'/תשרי/תשפ"ב</a:t>
             </a:fld>
             <a:endParaRPr lang="he-IL"/>
           </a:p>
@@ -469,7 +469,7 @@
           <a:p>
             <a:fld id="{A1208381-D324-4E16-878A-260944863543}" type="datetimeFigureOut">
               <a:rPr lang="he-IL" smtClean="0"/>
-              <a:t>ח'/אלול/תשפ"א</a:t>
+              <a:t>ל'/תשרי/תשפ"ב</a:t>
             </a:fld>
             <a:endParaRPr lang="he-IL"/>
           </a:p>
@@ -679,7 +679,7 @@
           <a:p>
             <a:fld id="{A1208381-D324-4E16-878A-260944863543}" type="datetimeFigureOut">
               <a:rPr lang="he-IL" smtClean="0"/>
-              <a:t>ח'/אלול/תשפ"א</a:t>
+              <a:t>ל'/תשרי/תשפ"ב</a:t>
             </a:fld>
             <a:endParaRPr lang="he-IL"/>
           </a:p>
@@ -879,7 +879,7 @@
           <a:p>
             <a:fld id="{A1208381-D324-4E16-878A-260944863543}" type="datetimeFigureOut">
               <a:rPr lang="he-IL" smtClean="0"/>
-              <a:t>ח'/אלול/תשפ"א</a:t>
+              <a:t>ל'/תשרי/תשפ"ב</a:t>
             </a:fld>
             <a:endParaRPr lang="he-IL"/>
           </a:p>
@@ -1155,7 +1155,7 @@
           <a:p>
             <a:fld id="{A1208381-D324-4E16-878A-260944863543}" type="datetimeFigureOut">
               <a:rPr lang="he-IL" smtClean="0"/>
-              <a:t>ח'/אלול/תשפ"א</a:t>
+              <a:t>ל'/תשרי/תשפ"ב</a:t>
             </a:fld>
             <a:endParaRPr lang="he-IL"/>
           </a:p>
@@ -1423,7 +1423,7 @@
           <a:p>
             <a:fld id="{A1208381-D324-4E16-878A-260944863543}" type="datetimeFigureOut">
               <a:rPr lang="he-IL" smtClean="0"/>
-              <a:t>ח'/אלול/תשפ"א</a:t>
+              <a:t>ל'/תשרי/תשפ"ב</a:t>
             </a:fld>
             <a:endParaRPr lang="he-IL"/>
           </a:p>
@@ -1838,7 +1838,7 @@
           <a:p>
             <a:fld id="{A1208381-D324-4E16-878A-260944863543}" type="datetimeFigureOut">
               <a:rPr lang="he-IL" smtClean="0"/>
-              <a:t>ח'/אלול/תשפ"א</a:t>
+              <a:t>ל'/תשרי/תשפ"ב</a:t>
             </a:fld>
             <a:endParaRPr lang="he-IL"/>
           </a:p>
@@ -1980,7 +1980,7 @@
           <a:p>
             <a:fld id="{A1208381-D324-4E16-878A-260944863543}" type="datetimeFigureOut">
               <a:rPr lang="he-IL" smtClean="0"/>
-              <a:t>ח'/אלול/תשפ"א</a:t>
+              <a:t>ל'/תשרי/תשפ"ב</a:t>
             </a:fld>
             <a:endParaRPr lang="he-IL"/>
           </a:p>
@@ -2093,7 +2093,7 @@
           <a:p>
             <a:fld id="{A1208381-D324-4E16-878A-260944863543}" type="datetimeFigureOut">
               <a:rPr lang="he-IL" smtClean="0"/>
-              <a:t>ח'/אלול/תשפ"א</a:t>
+              <a:t>ל'/תשרי/תשפ"ב</a:t>
             </a:fld>
             <a:endParaRPr lang="he-IL"/>
           </a:p>
@@ -2406,7 +2406,7 @@
           <a:p>
             <a:fld id="{A1208381-D324-4E16-878A-260944863543}" type="datetimeFigureOut">
               <a:rPr lang="he-IL" smtClean="0"/>
-              <a:t>ח'/אלול/תשפ"א</a:t>
+              <a:t>ל'/תשרי/תשפ"ב</a:t>
             </a:fld>
             <a:endParaRPr lang="he-IL"/>
           </a:p>
@@ -2695,7 +2695,7 @@
           <a:p>
             <a:fld id="{A1208381-D324-4E16-878A-260944863543}" type="datetimeFigureOut">
               <a:rPr lang="he-IL" smtClean="0"/>
-              <a:t>ח'/אלול/תשפ"א</a:t>
+              <a:t>ל'/תשרי/תשפ"ב</a:t>
             </a:fld>
             <a:endParaRPr lang="he-IL"/>
           </a:p>
@@ -2938,7 +2938,7 @@
           <a:p>
             <a:fld id="{A1208381-D324-4E16-878A-260944863543}" type="datetimeFigureOut">
               <a:rPr lang="he-IL" smtClean="0"/>
-              <a:t>ח'/אלול/תשפ"א</a:t>
+              <a:t>ל'/תשרי/תשפ"ב</a:t>
             </a:fld>
             <a:endParaRPr lang="he-IL"/>
           </a:p>
@@ -9324,7 +9324,7 @@
             </p:nvSpPr>
             <p:spPr>
               <a:xfrm>
-                <a:off x="10572947" y="1363531"/>
+                <a:off x="10415935" y="1363531"/>
                 <a:ext cx="180871" cy="183550"/>
               </a:xfrm>
               <a:prstGeom prst="ellipse">
@@ -9379,7 +9379,7 @@
             </p:nvSpPr>
             <p:spPr>
               <a:xfrm>
-                <a:off x="8774351" y="1363531"/>
+                <a:off x="8922127" y="1363531"/>
                 <a:ext cx="180871" cy="183550"/>
               </a:xfrm>
               <a:prstGeom prst="ellipse">
@@ -9436,9 +9436,9 @@
         </p:nvGrpSpPr>
         <p:grpSpPr>
           <a:xfrm>
-            <a:off x="3328616" y="672400"/>
+            <a:off x="3365560" y="672400"/>
             <a:ext cx="2706872" cy="1182255"/>
-            <a:chOff x="3328616" y="672400"/>
+            <a:chOff x="3365560" y="672400"/>
             <a:chExt cx="2706872" cy="1182255"/>
           </a:xfrm>
         </p:grpSpPr>
@@ -10415,7 +10415,7 @@
           </p:nvSpPr>
           <p:spPr>
             <a:xfrm>
-              <a:off x="3328616" y="693854"/>
+              <a:off x="3365560" y="693854"/>
               <a:ext cx="2706872" cy="307777"/>
             </a:xfrm>
             <a:prstGeom prst="rect">

</xml_diff>